<commit_message>
added lecture 6 slides
</commit_message>
<xml_diff>
--- a/IAP-CSharp-Lecture-6.pptx
+++ b/IAP-CSharp-Lecture-6.pptx
@@ -358,7 +358,7 @@
           <a:p>
             <a:fld id="{4FF7DAA3-C1EB-4651-B685-018E5DC71BB1}" type="datetimeFigureOut">
               <a:rPr lang="en-US" smtClean="0"/>
-              <a:t>1/23/2011</a:t>
+              <a:t>1/25/2011</a:t>
             </a:fld>
             <a:endParaRPr lang="en-US"/>
           </a:p>
@@ -528,7 +528,7 @@
           <a:p>
             <a:fld id="{4FF7DAA3-C1EB-4651-B685-018E5DC71BB1}" type="datetimeFigureOut">
               <a:rPr lang="en-US" smtClean="0"/>
-              <a:t>1/23/2011</a:t>
+              <a:t>1/25/2011</a:t>
             </a:fld>
             <a:endParaRPr lang="en-US"/>
           </a:p>
@@ -708,7 +708,7 @@
           <a:p>
             <a:fld id="{4FF7DAA3-C1EB-4651-B685-018E5DC71BB1}" type="datetimeFigureOut">
               <a:rPr lang="en-US" smtClean="0"/>
-              <a:t>1/23/2011</a:t>
+              <a:t>1/25/2011</a:t>
             </a:fld>
             <a:endParaRPr lang="en-US"/>
           </a:p>
@@ -878,7 +878,7 @@
           <a:p>
             <a:fld id="{4FF7DAA3-C1EB-4651-B685-018E5DC71BB1}" type="datetimeFigureOut">
               <a:rPr lang="en-US" smtClean="0"/>
-              <a:t>1/23/2011</a:t>
+              <a:t>1/25/2011</a:t>
             </a:fld>
             <a:endParaRPr lang="en-US"/>
           </a:p>
@@ -1124,7 +1124,7 @@
           <a:p>
             <a:fld id="{4FF7DAA3-C1EB-4651-B685-018E5DC71BB1}" type="datetimeFigureOut">
               <a:rPr lang="en-US" smtClean="0"/>
-              <a:t>1/23/2011</a:t>
+              <a:t>1/25/2011</a:t>
             </a:fld>
             <a:endParaRPr lang="en-US"/>
           </a:p>
@@ -1412,7 +1412,7 @@
           <a:p>
             <a:fld id="{4FF7DAA3-C1EB-4651-B685-018E5DC71BB1}" type="datetimeFigureOut">
               <a:rPr lang="en-US" smtClean="0"/>
-              <a:t>1/23/2011</a:t>
+              <a:t>1/25/2011</a:t>
             </a:fld>
             <a:endParaRPr lang="en-US"/>
           </a:p>
@@ -1834,7 +1834,7 @@
           <a:p>
             <a:fld id="{4FF7DAA3-C1EB-4651-B685-018E5DC71BB1}" type="datetimeFigureOut">
               <a:rPr lang="en-US" smtClean="0"/>
-              <a:t>1/23/2011</a:t>
+              <a:t>1/25/2011</a:t>
             </a:fld>
             <a:endParaRPr lang="en-US"/>
           </a:p>
@@ -1952,7 +1952,7 @@
           <a:p>
             <a:fld id="{4FF7DAA3-C1EB-4651-B685-018E5DC71BB1}" type="datetimeFigureOut">
               <a:rPr lang="en-US" smtClean="0"/>
-              <a:t>1/23/2011</a:t>
+              <a:t>1/25/2011</a:t>
             </a:fld>
             <a:endParaRPr lang="en-US"/>
           </a:p>
@@ -2047,7 +2047,7 @@
           <a:p>
             <a:fld id="{4FF7DAA3-C1EB-4651-B685-018E5DC71BB1}" type="datetimeFigureOut">
               <a:rPr lang="en-US" smtClean="0"/>
-              <a:t>1/23/2011</a:t>
+              <a:t>1/25/2011</a:t>
             </a:fld>
             <a:endParaRPr lang="en-US"/>
           </a:p>
@@ -2324,7 +2324,7 @@
           <a:p>
             <a:fld id="{4FF7DAA3-C1EB-4651-B685-018E5DC71BB1}" type="datetimeFigureOut">
               <a:rPr lang="en-US" smtClean="0"/>
-              <a:t>1/23/2011</a:t>
+              <a:t>1/25/2011</a:t>
             </a:fld>
             <a:endParaRPr lang="en-US"/>
           </a:p>
@@ -2577,7 +2577,7 @@
           <a:p>
             <a:fld id="{4FF7DAA3-C1EB-4651-B685-018E5DC71BB1}" type="datetimeFigureOut">
               <a:rPr lang="en-US" smtClean="0"/>
-              <a:t>1/23/2011</a:t>
+              <a:t>1/25/2011</a:t>
             </a:fld>
             <a:endParaRPr lang="en-US"/>
           </a:p>
@@ -2790,7 +2790,7 @@
           <a:p>
             <a:fld id="{4FF7DAA3-C1EB-4651-B685-018E5DC71BB1}" type="datetimeFigureOut">
               <a:rPr lang="en-US" smtClean="0"/>
-              <a:t>1/23/2011</a:t>
+              <a:t>1/25/2011</a:t>
             </a:fld>
             <a:endParaRPr lang="en-US"/>
           </a:p>
@@ -3182,15 +3182,19 @@
           <a:p>
             <a:r>
               <a:rPr lang="en-US" dirty="0" smtClean="0"/>
-              <a:t>Interoperability between C# and </a:t>
-            </a:r>
-            <a:r>
-              <a:rPr lang="en-US" dirty="0" err="1" smtClean="0"/>
-              <a:t>and</a:t>
+              <a:t>Interoperability between C# </a:t>
+            </a:r>
+            <a:r>
+              <a:rPr lang="en-US" smtClean="0"/>
+              <a:t>and </a:t>
+            </a:r>
+            <a:r>
+              <a:rPr lang="en-US" smtClean="0"/>
+              <a:t>other </a:t>
             </a:r>
             <a:r>
               <a:rPr lang="en-US" dirty="0" smtClean="0"/>
-              <a:t> other languages</a:t>
+              <a:t>languages</a:t>
             </a:r>
             <a:endParaRPr lang="en-US" dirty="0"/>
           </a:p>
@@ -16073,7 +16077,15 @@
           <a:p>
             <a:r>
               <a:rPr lang="en-US" dirty="0" smtClean="0"/>
-              <a:t>An unmanaged (written in C) interface that allows your program to interact with Windows system services</a:t>
+              <a:t>An unmanaged (written in C) </a:t>
+            </a:r>
+            <a:r>
+              <a:rPr lang="en-US" dirty="0" smtClean="0"/>
+              <a:t>library that </a:t>
+            </a:r>
+            <a:r>
+              <a:rPr lang="en-US" dirty="0" smtClean="0"/>
+              <a:t>allows your program to interact with Windows system services</a:t>
             </a:r>
           </a:p>
           <a:p>
@@ -23910,7 +23922,15 @@
           <a:p>
             <a:r>
               <a:rPr lang="en-US" dirty="0" smtClean="0"/>
-              <a:t>An unmanaged (written in C) interface that allows your program to interact with Windows system services</a:t>
+              <a:t>An unmanaged (written in C) </a:t>
+            </a:r>
+            <a:r>
+              <a:rPr lang="en-US" dirty="0" smtClean="0"/>
+              <a:t>library that </a:t>
+            </a:r>
+            <a:r>
+              <a:rPr lang="en-US" dirty="0" smtClean="0"/>
+              <a:t>allows your program to interact with Windows system services</a:t>
             </a:r>
           </a:p>
           <a:p>
@@ -34326,7 +34346,15 @@
           <a:p>
             <a:r>
               <a:rPr lang="en-US" dirty="0" smtClean="0"/>
-              <a:t>An unmanaged (written in C) interface that allows your program to interact with Windows system services</a:t>
+              <a:t>An unmanaged (written in C) </a:t>
+            </a:r>
+            <a:r>
+              <a:rPr lang="en-US" dirty="0" smtClean="0"/>
+              <a:t>library that </a:t>
+            </a:r>
+            <a:r>
+              <a:rPr lang="en-US" dirty="0" smtClean="0"/>
+              <a:t>allows your program to interact with Windows system services</a:t>
             </a:r>
           </a:p>
           <a:p>
@@ -46442,13 +46470,8 @@
             </a:r>
             <a:r>
               <a:rPr lang="en-US" sz="2600" dirty="0" smtClean="0"/>
-              <a:t>&lt;T</a:t>
-            </a:r>
-            <a:r>
-              <a:rPr lang="en-US" sz="2600" dirty="0" smtClean="0"/>
-              <a:t>&gt;)</a:t>
-            </a:r>
-            <a:endParaRPr lang="en-US" sz="2600" dirty="0" smtClean="0"/>
+              <a:t>&lt;T&gt;)</a:t>
+            </a:r>
           </a:p>
           <a:p>
             <a:r>

</xml_diff>